<commit_message>
Finished 65% of schematics
</commit_message>
<xml_diff>
--- a/Logos/Plume_logo.pptx
+++ b/Logos/Plume_logo.pptx
@@ -104,6 +104,11 @@
       </a:defRPr>
     </a:lvl9pPr>
   </p:defaultTextStyle>
+  <p:extLst>
+    <p:ext uri="{EFAFB233-063F-42B5-8137-9DF3F51BA10A}">
+      <p15:sldGuideLst xmlns:p15="http://schemas.microsoft.com/office/powerpoint/2012/main"/>
+    </p:ext>
+  </p:extLst>
 </p:presentation>
 </file>
 
@@ -254,7 +259,7 @@
           <a:p>
             <a:fld id="{62FAB7A6-678C-B84F-847D-BC8BBB2A710B}" type="datetimeFigureOut">
               <a:rPr lang="fr-FR" smtClean="0"/>
-              <a:t>16/02/2025</a:t>
+              <a:t>20/03/2025</a:t>
             </a:fld>
             <a:endParaRPr lang="fr-FR"/>
           </a:p>
@@ -452,7 +457,7 @@
           <a:p>
             <a:fld id="{62FAB7A6-678C-B84F-847D-BC8BBB2A710B}" type="datetimeFigureOut">
               <a:rPr lang="fr-FR" smtClean="0"/>
-              <a:t>16/02/2025</a:t>
+              <a:t>20/03/2025</a:t>
             </a:fld>
             <a:endParaRPr lang="fr-FR"/>
           </a:p>
@@ -660,7 +665,7 @@
           <a:p>
             <a:fld id="{62FAB7A6-678C-B84F-847D-BC8BBB2A710B}" type="datetimeFigureOut">
               <a:rPr lang="fr-FR" smtClean="0"/>
-              <a:t>16/02/2025</a:t>
+              <a:t>20/03/2025</a:t>
             </a:fld>
             <a:endParaRPr lang="fr-FR"/>
           </a:p>
@@ -858,7 +863,7 @@
           <a:p>
             <a:fld id="{62FAB7A6-678C-B84F-847D-BC8BBB2A710B}" type="datetimeFigureOut">
               <a:rPr lang="fr-FR" smtClean="0"/>
-              <a:t>16/02/2025</a:t>
+              <a:t>20/03/2025</a:t>
             </a:fld>
             <a:endParaRPr lang="fr-FR"/>
           </a:p>
@@ -1133,7 +1138,7 @@
           <a:p>
             <a:fld id="{62FAB7A6-678C-B84F-847D-BC8BBB2A710B}" type="datetimeFigureOut">
               <a:rPr lang="fr-FR" smtClean="0"/>
-              <a:t>16/02/2025</a:t>
+              <a:t>20/03/2025</a:t>
             </a:fld>
             <a:endParaRPr lang="fr-FR"/>
           </a:p>
@@ -1398,7 +1403,7 @@
           <a:p>
             <a:fld id="{62FAB7A6-678C-B84F-847D-BC8BBB2A710B}" type="datetimeFigureOut">
               <a:rPr lang="fr-FR" smtClean="0"/>
-              <a:t>16/02/2025</a:t>
+              <a:t>20/03/2025</a:t>
             </a:fld>
             <a:endParaRPr lang="fr-FR"/>
           </a:p>
@@ -1810,7 +1815,7 @@
           <a:p>
             <a:fld id="{62FAB7A6-678C-B84F-847D-BC8BBB2A710B}" type="datetimeFigureOut">
               <a:rPr lang="fr-FR" smtClean="0"/>
-              <a:t>16/02/2025</a:t>
+              <a:t>20/03/2025</a:t>
             </a:fld>
             <a:endParaRPr lang="fr-FR"/>
           </a:p>
@@ -1951,7 +1956,7 @@
           <a:p>
             <a:fld id="{62FAB7A6-678C-B84F-847D-BC8BBB2A710B}" type="datetimeFigureOut">
               <a:rPr lang="fr-FR" smtClean="0"/>
-              <a:t>16/02/2025</a:t>
+              <a:t>20/03/2025</a:t>
             </a:fld>
             <a:endParaRPr lang="fr-FR"/>
           </a:p>
@@ -2064,7 +2069,7 @@
           <a:p>
             <a:fld id="{62FAB7A6-678C-B84F-847D-BC8BBB2A710B}" type="datetimeFigureOut">
               <a:rPr lang="fr-FR" smtClean="0"/>
-              <a:t>16/02/2025</a:t>
+              <a:t>20/03/2025</a:t>
             </a:fld>
             <a:endParaRPr lang="fr-FR"/>
           </a:p>
@@ -2375,7 +2380,7 @@
           <a:p>
             <a:fld id="{62FAB7A6-678C-B84F-847D-BC8BBB2A710B}" type="datetimeFigureOut">
               <a:rPr lang="fr-FR" smtClean="0"/>
-              <a:t>16/02/2025</a:t>
+              <a:t>20/03/2025</a:t>
             </a:fld>
             <a:endParaRPr lang="fr-FR"/>
           </a:p>
@@ -2663,7 +2668,7 @@
           <a:p>
             <a:fld id="{62FAB7A6-678C-B84F-847D-BC8BBB2A710B}" type="datetimeFigureOut">
               <a:rPr lang="fr-FR" smtClean="0"/>
-              <a:t>16/02/2025</a:t>
+              <a:t>20/03/2025</a:t>
             </a:fld>
             <a:endParaRPr lang="fr-FR"/>
           </a:p>
@@ -2904,7 +2909,7 @@
           <a:p>
             <a:fld id="{62FAB7A6-678C-B84F-847D-BC8BBB2A710B}" type="datetimeFigureOut">
               <a:rPr lang="fr-FR" smtClean="0"/>
-              <a:t>16/02/2025</a:t>
+              <a:t>20/03/2025</a:t>
             </a:fld>
             <a:endParaRPr lang="fr-FR"/>
           </a:p>
@@ -3323,10 +3328,10 @@
       </p:grpSpPr>
       <p:grpSp>
         <p:nvGrpSpPr>
-          <p:cNvPr id="18" name="Groupe 17">
-            <a:extLst>
-              <a:ext uri="{FF2B5EF4-FFF2-40B4-BE49-F238E27FC236}">
-                <a16:creationId xmlns:a16="http://schemas.microsoft.com/office/drawing/2014/main" id="{C1F6D7FF-B80D-DAD9-9597-528403FE9736}"/>
+          <p:cNvPr id="3" name="Groupe 2">
+            <a:extLst>
+              <a:ext uri="{FF2B5EF4-FFF2-40B4-BE49-F238E27FC236}">
+                <a16:creationId xmlns:a16="http://schemas.microsoft.com/office/drawing/2014/main" id="{75655858-8904-FFDC-4215-A08D925AA08F}"/>
               </a:ext>
             </a:extLst>
           </p:cNvPr>
@@ -3341,59 +3346,145 @@
             <a:chExt cx="5040768" cy="2389472"/>
           </a:xfrm>
         </p:grpSpPr>
-        <p:pic>
-          <p:nvPicPr>
-            <p:cNvPr id="6" name="Image 5" descr="Une image contenant plume, stylos et plumes, outil d’écriture, Photographie de nature morte&#10;&#10;Le contenu généré par l’IA peut être incorrect.">
+        <p:grpSp>
+          <p:nvGrpSpPr>
+            <p:cNvPr id="18" name="Groupe 17">
               <a:extLst>
                 <a:ext uri="{FF2B5EF4-FFF2-40B4-BE49-F238E27FC236}">
-                  <a16:creationId xmlns:a16="http://schemas.microsoft.com/office/drawing/2014/main" id="{2162B352-D311-5A17-5E2C-C79F1EA6EF2F}"/>
+                  <a16:creationId xmlns:a16="http://schemas.microsoft.com/office/drawing/2014/main" id="{C1F6D7FF-B80D-DAD9-9597-528403FE9736}"/>
                 </a:ext>
               </a:extLst>
             </p:cNvPr>
-            <p:cNvPicPr>
-              <a:picLocks noChangeAspect="1"/>
-            </p:cNvPicPr>
+            <p:cNvGrpSpPr/>
             <p:nvPr/>
-          </p:nvPicPr>
-          <p:blipFill>
-            <a:blip r:embed="rId2">
-              <a:extLst>
-                <a:ext uri="{BEBA8EAE-BF5A-486C-A8C5-ECC9F3942E4B}">
-                  <a14:imgProps xmlns:a14="http://schemas.microsoft.com/office/drawing/2010/main">
-                    <a14:imgLayer r:embed="rId3">
-                      <a14:imgEffect>
-                        <a14:colorTemperature colorTemp="11500"/>
-                      </a14:imgEffect>
-                      <a14:imgEffect>
-                        <a14:saturation sat="0"/>
-                      </a14:imgEffect>
-                      <a14:imgEffect>
-                        <a14:brightnessContrast contrast="100000"/>
-                      </a14:imgEffect>
-                    </a14:imgLayer>
-                  </a14:imgProps>
-                </a:ext>
-              </a:extLst>
-            </a:blip>
-            <a:srcRect t="1" b="2744"/>
-            <a:stretch/>
-          </p:blipFill>
-          <p:spPr>
-            <a:xfrm rot="5400000">
-              <a:off x="5236076" y="1795902"/>
-              <a:ext cx="1482715" cy="3629218"/>
+          </p:nvGrpSpPr>
+          <p:grpSpPr>
+            <a:xfrm>
+              <a:off x="2751275" y="2314383"/>
+              <a:ext cx="5040768" cy="2389472"/>
+              <a:chOff x="2751275" y="2314383"/>
+              <a:chExt cx="5040768" cy="2389472"/>
             </a:xfrm>
-            <a:prstGeom prst="rect">
-              <a:avLst/>
-            </a:prstGeom>
-          </p:spPr>
-        </p:pic>
+          </p:grpSpPr>
+          <p:pic>
+            <p:nvPicPr>
+              <p:cNvPr id="6" name="Image 5" descr="Une image contenant plume, stylos et plumes, outil d’écriture, Photographie de nature morte&#10;&#10;Le contenu généré par l’IA peut être incorrect.">
+                <a:extLst>
+                  <a:ext uri="{FF2B5EF4-FFF2-40B4-BE49-F238E27FC236}">
+                    <a16:creationId xmlns:a16="http://schemas.microsoft.com/office/drawing/2014/main" id="{2162B352-D311-5A17-5E2C-C79F1EA6EF2F}"/>
+                  </a:ext>
+                </a:extLst>
+              </p:cNvPr>
+              <p:cNvPicPr>
+                <a:picLocks noChangeAspect="1"/>
+              </p:cNvPicPr>
+              <p:nvPr/>
+            </p:nvPicPr>
+            <p:blipFill>
+              <a:blip r:embed="rId2">
+                <a:extLst>
+                  <a:ext uri="{BEBA8EAE-BF5A-486C-A8C5-ECC9F3942E4B}">
+                    <a14:imgProps xmlns:a14="http://schemas.microsoft.com/office/drawing/2010/main">
+                      <a14:imgLayer r:embed="rId3">
+                        <a14:imgEffect>
+                          <a14:colorTemperature colorTemp="11500"/>
+                        </a14:imgEffect>
+                        <a14:imgEffect>
+                          <a14:saturation sat="0"/>
+                        </a14:imgEffect>
+                        <a14:imgEffect>
+                          <a14:brightnessContrast contrast="100000"/>
+                        </a14:imgEffect>
+                      </a14:imgLayer>
+                    </a14:imgProps>
+                  </a:ext>
+                </a:extLst>
+              </a:blip>
+              <a:srcRect t="1" b="2744"/>
+              <a:stretch/>
+            </p:blipFill>
+            <p:spPr>
+              <a:xfrm rot="5400000">
+                <a:off x="5236076" y="1795902"/>
+                <a:ext cx="1482715" cy="3629218"/>
+              </a:xfrm>
+              <a:prstGeom prst="rect">
+                <a:avLst/>
+              </a:prstGeom>
+            </p:spPr>
+          </p:pic>
+          <p:sp>
+            <p:nvSpPr>
+              <p:cNvPr id="15" name="Titre 1">
+                <a:extLst>
+                  <a:ext uri="{FF2B5EF4-FFF2-40B4-BE49-F238E27FC236}">
+                    <a16:creationId xmlns:a16="http://schemas.microsoft.com/office/drawing/2014/main" id="{32FF0BFD-F8B1-DF43-5432-68C4A81DB1EA}"/>
+                  </a:ext>
+                </a:extLst>
+              </p:cNvPr>
+              <p:cNvSpPr txBox="1">
+                <a:spLocks/>
+              </p:cNvSpPr>
+              <p:nvPr/>
+            </p:nvSpPr>
+            <p:spPr>
+              <a:xfrm>
+                <a:off x="2751275" y="2314383"/>
+                <a:ext cx="4203865" cy="2389472"/>
+              </a:xfrm>
+              <a:prstGeom prst="rect">
+                <a:avLst/>
+              </a:prstGeom>
+            </p:spPr>
+            <p:txBody>
+              <a:bodyPr vert="horz" lIns="91440" tIns="45720" rIns="91440" bIns="45720" rtlCol="0" anchor="ctr">
+                <a:normAutofit fontScale="82500" lnSpcReduction="10000"/>
+              </a:bodyPr>
+              <a:lstStyle>
+                <a:lvl1pPr algn="ctr" defTabSz="914400" rtl="0" eaLnBrk="1" latinLnBrk="0" hangingPunct="1">
+                  <a:lnSpc>
+                    <a:spcPct val="90000"/>
+                  </a:lnSpc>
+                  <a:spcBef>
+                    <a:spcPct val="0"/>
+                  </a:spcBef>
+                  <a:buNone/>
+                  <a:defRPr sz="6000" kern="1200">
+                    <a:solidFill>
+                      <a:schemeClr val="tx1"/>
+                    </a:solidFill>
+                    <a:latin typeface="+mj-lt"/>
+                    <a:ea typeface="+mj-ea"/>
+                    <a:cs typeface="+mj-cs"/>
+                  </a:defRPr>
+                </a:lvl1pPr>
+              </a:lstStyle>
+              <a:p>
+                <a:r>
+                  <a:rPr lang="fr-FR" sz="19400" spc="300" dirty="0">
+                    <a:latin typeface="FeatherScript" pitchFamily="2" charset="0"/>
+                  </a:rPr>
+                  <a:t>P</a:t>
+                </a:r>
+                <a:r>
+                  <a:rPr lang="fr-FR" sz="14400" dirty="0">
+                    <a:latin typeface="FeatherScript" pitchFamily="2" charset="0"/>
+                  </a:rPr>
+                  <a:t>lume</a:t>
+                </a:r>
+                <a:endParaRPr lang="fr-FR" sz="6600" dirty="0">
+                  <a:latin typeface="FeatherScript" pitchFamily="2" charset="0"/>
+                </a:endParaRPr>
+              </a:p>
+            </p:txBody>
+          </p:sp>
+        </p:grpSp>
         <p:sp>
           <p:nvSpPr>
-            <p:cNvPr id="15" name="Titre 1">
+            <p:cNvPr id="2" name="Titre 1">
               <a:extLst>
                 <a:ext uri="{FF2B5EF4-FFF2-40B4-BE49-F238E27FC236}">
-                  <a16:creationId xmlns:a16="http://schemas.microsoft.com/office/drawing/2014/main" id="{32FF0BFD-F8B1-DF43-5432-68C4A81DB1EA}"/>
+                  <a16:creationId xmlns:a16="http://schemas.microsoft.com/office/drawing/2014/main" id="{71B42FFC-8F75-8190-21DB-1266882E085D}"/>
                 </a:ext>
               </a:extLst>
             </p:cNvPr>
@@ -3404,8 +3495,8 @@
           </p:nvSpPr>
           <p:spPr>
             <a:xfrm>
-              <a:off x="2751275" y="2314383"/>
-              <a:ext cx="4203865" cy="2389472"/>
+              <a:off x="2937831" y="3429000"/>
+              <a:ext cx="1763641" cy="1142996"/>
             </a:xfrm>
             <a:prstGeom prst="rect">
               <a:avLst/>
@@ -3413,7 +3504,7 @@
           </p:spPr>
           <p:txBody>
             <a:bodyPr vert="horz" lIns="91440" tIns="45720" rIns="91440" bIns="45720" rtlCol="0" anchor="ctr">
-              <a:normAutofit fontScale="82500" lnSpcReduction="10000"/>
+              <a:normAutofit fontScale="97500"/>
             </a:bodyPr>
             <a:lstStyle>
               <a:lvl1pPr algn="ctr" defTabSz="914400" rtl="0" eaLnBrk="1" latinLnBrk="0" hangingPunct="1">
@@ -3436,18 +3527,12 @@
             </a:lstStyle>
             <a:p>
               <a:r>
-                <a:rPr lang="fr-FR" sz="19400" spc="300" dirty="0">
+                <a:rPr lang="fr-FR" sz="3600" spc="300" dirty="0">
                   <a:latin typeface="FeatherScript" pitchFamily="2" charset="0"/>
                 </a:rPr>
-                <a:t>P</a:t>
+                <a:t>V1.0</a:t>
               </a:r>
-              <a:r>
-                <a:rPr lang="fr-FR" sz="14400" dirty="0">
-                  <a:latin typeface="FeatherScript" pitchFamily="2" charset="0"/>
-                </a:rPr>
-                <a:t>lume</a:t>
-              </a:r>
-              <a:endParaRPr lang="fr-FR" sz="6600" dirty="0">
+              <a:endParaRPr lang="fr-FR" sz="3600" dirty="0">
                 <a:latin typeface="FeatherScript" pitchFamily="2" charset="0"/>
               </a:endParaRPr>
             </a:p>

</xml_diff>